<commit_message>
Update CMS_content_wordpress_modellering og aggregering.pptx
add custom post type and plugins
</commit_message>
<xml_diff>
--- a/semester2 PPT/CMS_content_wordpress_modellering og aggregering.pptx
+++ b/semester2 PPT/CMS_content_wordpress_modellering og aggregering.pptx
@@ -6,7 +6,7 @@
     <p:sldMasterId id="2147483671" r:id="rId5"/>
   </p:sldMasterIdLst>
   <p:notesMasterIdLst>
-    <p:notesMasterId r:id="rId27"/>
+    <p:notesMasterId r:id="rId26"/>
   </p:notesMasterIdLst>
   <p:sldIdLst>
     <p:sldId id="256" r:id="rId6"/>
@@ -19,17 +19,16 @@
     <p:sldId id="289" r:id="rId13"/>
     <p:sldId id="303" r:id="rId14"/>
     <p:sldId id="302" r:id="rId15"/>
-    <p:sldId id="301" r:id="rId16"/>
-    <p:sldId id="288" r:id="rId17"/>
-    <p:sldId id="290" r:id="rId18"/>
-    <p:sldId id="257" r:id="rId19"/>
-    <p:sldId id="258" r:id="rId20"/>
-    <p:sldId id="259" r:id="rId21"/>
-    <p:sldId id="260" r:id="rId22"/>
-    <p:sldId id="297" r:id="rId23"/>
-    <p:sldId id="298" r:id="rId24"/>
-    <p:sldId id="304" r:id="rId25"/>
-    <p:sldId id="305" r:id="rId26"/>
+    <p:sldId id="290" r:id="rId16"/>
+    <p:sldId id="257" r:id="rId17"/>
+    <p:sldId id="258" r:id="rId18"/>
+    <p:sldId id="259" r:id="rId19"/>
+    <p:sldId id="260" r:id="rId20"/>
+    <p:sldId id="297" r:id="rId21"/>
+    <p:sldId id="306" r:id="rId22"/>
+    <p:sldId id="298" r:id="rId23"/>
+    <p:sldId id="304" r:id="rId24"/>
+    <p:sldId id="305" r:id="rId25"/>
   </p:sldIdLst>
   <p:sldSz cx="9144000" cy="5143500" type="screen16x9"/>
   <p:notesSz cx="6858000" cy="9144000"/>
@@ -2309,136 +2308,6 @@
   <p:cSld>
     <p:spTree>
       <p:nvGrpSpPr>
-        <p:cNvPr id="1" name="Shape 155"/>
-        <p:cNvGrpSpPr/>
-        <p:nvPr/>
-      </p:nvGrpSpPr>
-      <p:grpSpPr>
-        <a:xfrm>
-          <a:off x="0" y="0"/>
-          <a:ext cx="0" cy="0"/>
-          <a:chOff x="0" y="0"/>
-          <a:chExt cx="0" cy="0"/>
-        </a:xfrm>
-      </p:grpSpPr>
-      <p:sp>
-        <p:nvSpPr>
-          <p:cNvPr id="156" name="Google Shape;156;g40b6edb6fc_0_97:notes"/>
-          <p:cNvSpPr>
-            <a:spLocks noGrp="1" noRot="1" noChangeAspect="1"/>
-          </p:cNvSpPr>
-          <p:nvPr>
-            <p:ph type="sldImg" idx="2"/>
-          </p:nvPr>
-        </p:nvSpPr>
-        <p:spPr>
-          <a:xfrm>
-            <a:off x="381000" y="685800"/>
-            <a:ext cx="6096000" cy="3429000"/>
-          </a:xfrm>
-          <a:custGeom>
-            <a:avLst/>
-            <a:gdLst/>
-            <a:ahLst/>
-            <a:cxnLst/>
-            <a:rect l="l" t="t" r="r" b="b"/>
-            <a:pathLst>
-              <a:path w="120000" h="120000" extrusionOk="0">
-                <a:moveTo>
-                  <a:pt x="0" y="0"/>
-                </a:moveTo>
-                <a:lnTo>
-                  <a:pt x="120000" y="0"/>
-                </a:lnTo>
-                <a:lnTo>
-                  <a:pt x="120000" y="120000"/>
-                </a:lnTo>
-                <a:lnTo>
-                  <a:pt x="0" y="120000"/>
-                </a:lnTo>
-                <a:close/>
-              </a:path>
-            </a:pathLst>
-          </a:custGeom>
-          <a:noFill/>
-          <a:ln w="9525" cap="flat" cmpd="sng">
-            <a:solidFill>
-              <a:srgbClr val="000000"/>
-            </a:solidFill>
-            <a:prstDash val="solid"/>
-            <a:round/>
-            <a:headEnd type="none" w="sm" len="sm"/>
-            <a:tailEnd type="none" w="sm" len="sm"/>
-          </a:ln>
-        </p:spPr>
-      </p:sp>
-      <p:sp>
-        <p:nvSpPr>
-          <p:cNvPr id="157" name="Google Shape;157;g40b6edb6fc_0_97:notes"/>
-          <p:cNvSpPr txBox="1">
-            <a:spLocks noGrp="1"/>
-          </p:cNvSpPr>
-          <p:nvPr>
-            <p:ph type="body" idx="1"/>
-          </p:nvPr>
-        </p:nvSpPr>
-        <p:spPr>
-          <a:xfrm>
-            <a:off x="685800" y="4343400"/>
-            <a:ext cx="5486400" cy="4114800"/>
-          </a:xfrm>
-          <a:prstGeom prst="rect">
-            <a:avLst/>
-          </a:prstGeom>
-          <a:noFill/>
-          <a:ln>
-            <a:noFill/>
-          </a:ln>
-        </p:spPr>
-        <p:txBody>
-          <a:bodyPr spcFirstLastPara="1" wrap="square" lIns="91425" tIns="91425" rIns="91425" bIns="91425" anchor="t" anchorCtr="0">
-            <a:noAutofit/>
-          </a:bodyPr>
-          <a:lstStyle/>
-          <a:p>
-            <a:pPr marL="0" marR="0" lvl="0" indent="0" algn="l" rtl="0">
-              <a:spcBef>
-                <a:spcPts val="0"/>
-              </a:spcBef>
-              <a:spcAft>
-                <a:spcPts val="0"/>
-              </a:spcAft>
-              <a:buClr>
-                <a:schemeClr val="dk1"/>
-              </a:buClr>
-              <a:buFont typeface="Arial"/>
-              <a:buNone/>
-            </a:pPr>
-            <a:endParaRPr sz="1100" b="0" i="0" u="none" strike="noStrike" cap="none">
-              <a:solidFill>
-                <a:schemeClr val="dk1"/>
-              </a:solidFill>
-              <a:latin typeface="Arial"/>
-              <a:ea typeface="Arial"/>
-              <a:cs typeface="Arial"/>
-              <a:sym typeface="Arial"/>
-            </a:endParaRPr>
-          </a:p>
-        </p:txBody>
-      </p:sp>
-    </p:spTree>
-  </p:cSld>
-  <p:clrMapOvr>
-    <a:masterClrMapping/>
-  </p:clrMapOvr>
-</p:notes>
-</file>
-
-<file path=ppt/notesSlides/notesSlide5.xml><?xml version="1.0" encoding="utf-8"?>
-<p:notes xmlns:a="http://schemas.openxmlformats.org/drawingml/2006/main" xmlns:r="http://schemas.openxmlformats.org/officeDocument/2006/relationships" xmlns:p="http://schemas.openxmlformats.org/presentationml/2006/main" showMasterSp="0" showMasterPhAnim="0">
-  <p:cSld>
-    <p:spTree>
-      <p:nvGrpSpPr>
         <p:cNvPr id="1" name="Shape 101"/>
         <p:cNvGrpSpPr/>
         <p:nvPr/>
@@ -2957,7 +2826,7 @@
 </p:notes>
 </file>
 
-<file path=ppt/notesSlides/notesSlide6.xml><?xml version="1.0" encoding="utf-8"?>
+<file path=ppt/notesSlides/notesSlide5.xml><?xml version="1.0" encoding="utf-8"?>
 <p:notes xmlns:a="http://schemas.openxmlformats.org/drawingml/2006/main" xmlns:r="http://schemas.openxmlformats.org/officeDocument/2006/relationships" xmlns:p="http://schemas.openxmlformats.org/presentationml/2006/main" showMasterSp="0" showMasterPhAnim="0">
   <p:cSld>
     <p:spTree>
@@ -3061,7 +2930,7 @@
 </p:notes>
 </file>
 
-<file path=ppt/notesSlides/notesSlide7.xml><?xml version="1.0" encoding="utf-8"?>
+<file path=ppt/notesSlides/notesSlide6.xml><?xml version="1.0" encoding="utf-8"?>
 <p:notes xmlns:a="http://schemas.openxmlformats.org/drawingml/2006/main" xmlns:r="http://schemas.openxmlformats.org/officeDocument/2006/relationships" xmlns:p="http://schemas.openxmlformats.org/presentationml/2006/main" showMasterSp="0" showMasterPhAnim="0">
   <p:cSld>
     <p:spTree>
@@ -3192,7 +3061,7 @@
 </p:notes>
 </file>
 
-<file path=ppt/notesSlides/notesSlide8.xml><?xml version="1.0" encoding="utf-8"?>
+<file path=ppt/notesSlides/notesSlide7.xml><?xml version="1.0" encoding="utf-8"?>
 <p:notes xmlns:a="http://schemas.openxmlformats.org/drawingml/2006/main" xmlns:r="http://schemas.openxmlformats.org/officeDocument/2006/relationships" xmlns:p="http://schemas.openxmlformats.org/presentationml/2006/main" showMasterSp="0" showMasterPhAnim="0">
   <p:cSld>
     <p:spTree>
@@ -16461,14 +16330,14 @@
               <a:buNone/>
             </a:pPr>
             <a:r>
-              <a:rPr lang="da">
+              <a:rPr lang="da" dirty="0">
                 <a:solidFill>
                   <a:srgbClr val="434343"/>
                 </a:solidFill>
               </a:rPr>
-              <a:t>3.sem MMD</a:t>
+              <a:t>2.sem MMD</a:t>
             </a:r>
-            <a:endParaRPr sz="2800" b="0" i="0" u="none" strike="noStrike" cap="none">
+            <a:endParaRPr sz="2800" b="0" i="0" u="none" strike="noStrike" cap="none" dirty="0">
               <a:solidFill>
                 <a:srgbClr val="434343"/>
               </a:solidFill>
@@ -16957,456 +16826,6 @@
   <p:cSld>
     <p:spTree>
       <p:nvGrpSpPr>
-        <p:cNvPr id="1" name="Shape 158"/>
-        <p:cNvGrpSpPr/>
-        <p:nvPr/>
-      </p:nvGrpSpPr>
-      <p:grpSpPr>
-        <a:xfrm>
-          <a:off x="0" y="0"/>
-          <a:ext cx="0" cy="0"/>
-          <a:chOff x="0" y="0"/>
-          <a:chExt cx="0" cy="0"/>
-        </a:xfrm>
-      </p:grpSpPr>
-      <p:sp>
-        <p:nvSpPr>
-          <p:cNvPr id="159" name="Google Shape;159;p34"/>
-          <p:cNvSpPr txBox="1">
-            <a:spLocks noGrp="1"/>
-          </p:cNvSpPr>
-          <p:nvPr>
-            <p:ph type="body" idx="1"/>
-          </p:nvPr>
-        </p:nvSpPr>
-        <p:spPr>
-          <a:xfrm>
-            <a:off x="311700" y="1389600"/>
-            <a:ext cx="2808000" cy="3179400"/>
-          </a:xfrm>
-          <a:prstGeom prst="rect">
-            <a:avLst/>
-          </a:prstGeom>
-          <a:noFill/>
-          <a:ln>
-            <a:noFill/>
-          </a:ln>
-        </p:spPr>
-        <p:txBody>
-          <a:bodyPr spcFirstLastPara="1" wrap="square" lIns="91425" tIns="91425" rIns="91425" bIns="91425" anchor="t" anchorCtr="0">
-            <a:noAutofit/>
-          </a:bodyPr>
-          <a:lstStyle/>
-          <a:p>
-            <a:pPr marL="0" marR="0" lvl="0" indent="0" algn="l" rtl="0">
-              <a:lnSpc>
-                <a:spcPct val="115000"/>
-              </a:lnSpc>
-              <a:spcBef>
-                <a:spcPts val="0"/>
-              </a:spcBef>
-              <a:spcAft>
-                <a:spcPts val="0"/>
-              </a:spcAft>
-              <a:buClr>
-                <a:schemeClr val="lt2"/>
-              </a:buClr>
-              <a:buFont typeface="Arial"/>
-              <a:buNone/>
-            </a:pPr>
-            <a:r>
-              <a:rPr lang="da" sz="1200" b="0" i="0" u="none" strike="noStrike" cap="none">
-                <a:solidFill>
-                  <a:schemeClr val="lt2"/>
-                </a:solidFill>
-                <a:latin typeface="Arial"/>
-                <a:ea typeface="Arial"/>
-                <a:cs typeface="Arial"/>
-                <a:sym typeface="Arial"/>
-              </a:rPr>
-              <a:t>To see if your theme works go to:</a:t>
-            </a:r>
-            <a:br>
-              <a:rPr lang="da" sz="1200" b="0" i="0" u="none" strike="noStrike" cap="none">
-                <a:solidFill>
-                  <a:schemeClr val="lt2"/>
-                </a:solidFill>
-                <a:latin typeface="Arial"/>
-                <a:ea typeface="Arial"/>
-                <a:cs typeface="Arial"/>
-                <a:sym typeface="Arial"/>
-              </a:rPr>
-            </a:br>
-            <a:r>
-              <a:rPr lang="da" sz="1200" b="0" i="0" u="sng" strike="noStrike" cap="none">
-                <a:solidFill>
-                  <a:schemeClr val="hlink"/>
-                </a:solidFill>
-                <a:latin typeface="Arial"/>
-                <a:ea typeface="Arial"/>
-                <a:cs typeface="Arial"/>
-                <a:sym typeface="Arial"/>
-                <a:hlinkClick r:id="rId3"/>
-              </a:rPr>
-              <a:t>http://localhost:8888/wordpress/wp-admin</a:t>
-            </a:r>
-            <a:endParaRPr/>
-          </a:p>
-          <a:p>
-            <a:pPr marL="0" marR="0" lvl="0" indent="0" algn="l" rtl="0">
-              <a:lnSpc>
-                <a:spcPct val="115000"/>
-              </a:lnSpc>
-              <a:spcBef>
-                <a:spcPts val="1600"/>
-              </a:spcBef>
-              <a:spcAft>
-                <a:spcPts val="0"/>
-              </a:spcAft>
-              <a:buClr>
-                <a:schemeClr val="lt2"/>
-              </a:buClr>
-              <a:buFont typeface="Arial"/>
-              <a:buNone/>
-            </a:pPr>
-            <a:r>
-              <a:rPr lang="da" sz="1200" b="0" i="0" u="none" strike="noStrike" cap="none">
-                <a:solidFill>
-                  <a:schemeClr val="lt2"/>
-                </a:solidFill>
-                <a:latin typeface="Arial"/>
-                <a:ea typeface="Arial"/>
-                <a:cs typeface="Arial"/>
-                <a:sym typeface="Arial"/>
-              </a:rPr>
-              <a:t>and login.</a:t>
-            </a:r>
-            <a:endParaRPr/>
-          </a:p>
-          <a:p>
-            <a:pPr marL="0" marR="0" lvl="0" indent="0" algn="l" rtl="0">
-              <a:lnSpc>
-                <a:spcPct val="115000"/>
-              </a:lnSpc>
-              <a:spcBef>
-                <a:spcPts val="1600"/>
-              </a:spcBef>
-              <a:spcAft>
-                <a:spcPts val="0"/>
-              </a:spcAft>
-              <a:buClr>
-                <a:schemeClr val="lt2"/>
-              </a:buClr>
-              <a:buFont typeface="Arial"/>
-              <a:buNone/>
-            </a:pPr>
-            <a:r>
-              <a:rPr lang="da" sz="1200" b="0" i="0" u="none" strike="noStrike" cap="none">
-                <a:solidFill>
-                  <a:schemeClr val="lt2"/>
-                </a:solidFill>
-                <a:latin typeface="Arial"/>
-                <a:ea typeface="Arial"/>
-                <a:cs typeface="Arial"/>
-                <a:sym typeface="Arial"/>
-              </a:rPr>
-              <a:t>Then in the left menu click on</a:t>
-            </a:r>
-            <a:br>
-              <a:rPr lang="da" sz="1200" b="0" i="0" u="none" strike="noStrike" cap="none">
-                <a:solidFill>
-                  <a:schemeClr val="lt2"/>
-                </a:solidFill>
-                <a:latin typeface="Arial"/>
-                <a:ea typeface="Arial"/>
-                <a:cs typeface="Arial"/>
-                <a:sym typeface="Arial"/>
-              </a:rPr>
-            </a:br>
-            <a:r>
-              <a:rPr lang="da" sz="1200" b="0" i="0" u="none" strike="noStrike" cap="none">
-                <a:solidFill>
-                  <a:schemeClr val="lt2"/>
-                </a:solidFill>
-                <a:latin typeface="Arial"/>
-                <a:ea typeface="Arial"/>
-                <a:cs typeface="Arial"/>
-                <a:sym typeface="Arial"/>
-              </a:rPr>
-              <a:t>Appearance &gt; Themes.</a:t>
-            </a:r>
-            <a:endParaRPr/>
-          </a:p>
-          <a:p>
-            <a:pPr marL="0" marR="0" lvl="0" indent="0" algn="l" rtl="0">
-              <a:lnSpc>
-                <a:spcPct val="115000"/>
-              </a:lnSpc>
-              <a:spcBef>
-                <a:spcPts val="1600"/>
-              </a:spcBef>
-              <a:spcAft>
-                <a:spcPts val="0"/>
-              </a:spcAft>
-              <a:buClr>
-                <a:schemeClr val="lt2"/>
-              </a:buClr>
-              <a:buFont typeface="Arial"/>
-              <a:buNone/>
-            </a:pPr>
-            <a:r>
-              <a:rPr lang="da" sz="1200" b="0" i="0" u="none" strike="noStrike" cap="none">
-                <a:solidFill>
-                  <a:schemeClr val="lt2"/>
-                </a:solidFill>
-                <a:latin typeface="Arial"/>
-                <a:ea typeface="Arial"/>
-                <a:cs typeface="Arial"/>
-                <a:sym typeface="Arial"/>
-              </a:rPr>
-              <a:t>The my-first-theme should show up.</a:t>
-            </a:r>
-            <a:endParaRPr/>
-          </a:p>
-        </p:txBody>
-      </p:sp>
-      <p:sp>
-        <p:nvSpPr>
-          <p:cNvPr id="160" name="Google Shape;160;p34"/>
-          <p:cNvSpPr txBox="1">
-            <a:spLocks noGrp="1"/>
-          </p:cNvSpPr>
-          <p:nvPr>
-            <p:ph type="title"/>
-          </p:nvPr>
-        </p:nvSpPr>
-        <p:spPr>
-          <a:xfrm>
-            <a:off x="311700" y="555600"/>
-            <a:ext cx="2808000" cy="755700"/>
-          </a:xfrm>
-          <a:prstGeom prst="rect">
-            <a:avLst/>
-          </a:prstGeom>
-          <a:noFill/>
-          <a:ln>
-            <a:noFill/>
-          </a:ln>
-        </p:spPr>
-        <p:txBody>
-          <a:bodyPr spcFirstLastPara="1" wrap="square" lIns="91425" tIns="91425" rIns="91425" bIns="91425" anchor="b" anchorCtr="0">
-            <a:noAutofit/>
-          </a:bodyPr>
-          <a:lstStyle/>
-          <a:p>
-            <a:pPr marL="0" marR="0" lvl="0" indent="0" algn="l" rtl="0">
-              <a:lnSpc>
-                <a:spcPct val="100000"/>
-              </a:lnSpc>
-              <a:spcBef>
-                <a:spcPts val="0"/>
-              </a:spcBef>
-              <a:spcAft>
-                <a:spcPts val="0"/>
-              </a:spcAft>
-              <a:buClr>
-                <a:schemeClr val="dk1"/>
-              </a:buClr>
-              <a:buFont typeface="Arial"/>
-              <a:buNone/>
-            </a:pPr>
-            <a:r>
-              <a:rPr lang="da" sz="2400" b="0" i="0" u="none" strike="noStrike" cap="none">
-                <a:solidFill>
-                  <a:schemeClr val="dk1"/>
-                </a:solidFill>
-                <a:latin typeface="Arial"/>
-                <a:ea typeface="Arial"/>
-                <a:cs typeface="Arial"/>
-                <a:sym typeface="Arial"/>
-              </a:rPr>
-              <a:t>Our new theme</a:t>
-            </a:r>
-            <a:endParaRPr/>
-          </a:p>
-        </p:txBody>
-      </p:sp>
-      <p:pic>
-        <p:nvPicPr>
-          <p:cNvPr id="161" name="Google Shape;161;p34"/>
-          <p:cNvPicPr preferRelativeResize="0"/>
-          <p:nvPr/>
-        </p:nvPicPr>
-        <p:blipFill rotWithShape="1">
-          <a:blip r:embed="rId4">
-            <a:alphaModFix/>
-          </a:blip>
-          <a:srcRect/>
-          <a:stretch/>
-        </p:blipFill>
-        <p:spPr>
-          <a:xfrm>
-            <a:off x="3882036" y="-639175"/>
-            <a:ext cx="5262000" cy="5782800"/>
-          </a:xfrm>
-          <a:prstGeom prst="rect">
-            <a:avLst/>
-          </a:prstGeom>
-          <a:noFill/>
-          <a:ln>
-            <a:noFill/>
-          </a:ln>
-        </p:spPr>
-      </p:pic>
-    </p:spTree>
-    <p:extLst>
-      <p:ext uri="{BB962C8B-B14F-4D97-AF65-F5344CB8AC3E}">
-        <p14:creationId xmlns:p14="http://schemas.microsoft.com/office/powerpoint/2010/main" val="4272566741"/>
-      </p:ext>
-    </p:extLst>
-  </p:cSld>
-  <p:clrMapOvr>
-    <a:masterClrMapping/>
-  </p:clrMapOvr>
-</p:sld>
-</file>
-
-<file path=ppt/slides/slide12.xml><?xml version="1.0" encoding="utf-8"?>
-<p:sld xmlns:a="http://schemas.openxmlformats.org/drawingml/2006/main" xmlns:r="http://schemas.openxmlformats.org/officeDocument/2006/relationships" xmlns:p="http://schemas.openxmlformats.org/presentationml/2006/main">
-  <p:cSld>
-    <p:spTree>
-      <p:nvGrpSpPr>
-        <p:cNvPr id="1" name=""/>
-        <p:cNvGrpSpPr/>
-        <p:nvPr/>
-      </p:nvGrpSpPr>
-      <p:grpSpPr>
-        <a:xfrm>
-          <a:off x="0" y="0"/>
-          <a:ext cx="0" cy="0"/>
-          <a:chOff x="0" y="0"/>
-          <a:chExt cx="0" cy="0"/>
-        </a:xfrm>
-      </p:grpSpPr>
-      <p:sp>
-        <p:nvSpPr>
-          <p:cNvPr id="2" name="Title 1">
-            <a:extLst>
-              <a:ext uri="{FF2B5EF4-FFF2-40B4-BE49-F238E27FC236}">
-                <a16:creationId xmlns:a16="http://schemas.microsoft.com/office/drawing/2014/main" id="{CFFD480B-68D2-45A2-F2FF-74D70B0C3BC9}"/>
-              </a:ext>
-            </a:extLst>
-          </p:cNvPr>
-          <p:cNvSpPr>
-            <a:spLocks noGrp="1"/>
-          </p:cNvSpPr>
-          <p:nvPr>
-            <p:ph type="title"/>
-          </p:nvPr>
-        </p:nvSpPr>
-        <p:spPr>
-          <a:xfrm>
-            <a:off x="-893270" y="92073"/>
-            <a:ext cx="8520600" cy="841800"/>
-          </a:xfrm>
-        </p:spPr>
-        <p:txBody>
-          <a:bodyPr/>
-          <a:lstStyle/>
-          <a:p>
-            <a:r>
-              <a:rPr lang="en-US"/>
-              <a:t>Download 3 themes- side 52</a:t>
-            </a:r>
-          </a:p>
-        </p:txBody>
-      </p:sp>
-      <p:pic>
-        <p:nvPicPr>
-          <p:cNvPr id="3" name="Picture 3">
-            <a:extLst>
-              <a:ext uri="{FF2B5EF4-FFF2-40B4-BE49-F238E27FC236}">
-                <a16:creationId xmlns:a16="http://schemas.microsoft.com/office/drawing/2014/main" id="{610979AC-460D-EE9D-7CA9-D151DFEF8C69}"/>
-              </a:ext>
-            </a:extLst>
-          </p:cNvPr>
-          <p:cNvPicPr>
-            <a:picLocks noChangeAspect="1"/>
-          </p:cNvPicPr>
-          <p:nvPr/>
-        </p:nvPicPr>
-        <p:blipFill rotWithShape="1">
-          <a:blip r:embed="rId2"/>
-          <a:srcRect l="22149" t="14286" r="26281" b="8466"/>
-          <a:stretch/>
-        </p:blipFill>
-        <p:spPr>
-          <a:xfrm>
-            <a:off x="1207310" y="747300"/>
-            <a:ext cx="4381037" cy="4109358"/>
-          </a:xfrm>
-          <a:prstGeom prst="rect">
-            <a:avLst/>
-          </a:prstGeom>
-        </p:spPr>
-      </p:pic>
-      <p:sp>
-        <p:nvSpPr>
-          <p:cNvPr id="4" name="TextBox 3">
-            <a:extLst>
-              <a:ext uri="{FF2B5EF4-FFF2-40B4-BE49-F238E27FC236}">
-                <a16:creationId xmlns:a16="http://schemas.microsoft.com/office/drawing/2014/main" id="{4EB397C3-E9F4-C376-C8A0-528E057EF08E}"/>
-              </a:ext>
-            </a:extLst>
-          </p:cNvPr>
-          <p:cNvSpPr txBox="1"/>
-          <p:nvPr/>
-        </p:nvSpPr>
-        <p:spPr>
-          <a:xfrm>
-            <a:off x="6070752" y="3471460"/>
-            <a:ext cx="2743200" cy="954107"/>
-          </a:xfrm>
-          <a:prstGeom prst="rect">
-            <a:avLst/>
-          </a:prstGeom>
-          <a:noFill/>
-        </p:spPr>
-        <p:txBody>
-          <a:bodyPr rot="0" spcFirstLastPara="0" vertOverflow="overflow" horzOverflow="overflow" vert="horz" wrap="square" lIns="91440" tIns="45720" rIns="91440" bIns="45720" numCol="1" spcCol="0" rtlCol="0" fromWordArt="0" anchor="t" anchorCtr="0" forceAA="0" compatLnSpc="1">
-            <a:prstTxWarp prst="textNoShape">
-              <a:avLst/>
-            </a:prstTxWarp>
-            <a:spAutoFit/>
-          </a:bodyPr>
-          <a:lstStyle/>
-          <a:p>
-            <a:pPr algn="l"/>
-            <a:r>
-              <a:rPr lang="en-US"/>
-              <a:t>https://ipaper.ipapercms.dk/ErhvervsakademiAarhus/Forskningsrapportguides/wordpress-in-the-classroom/</a:t>
-            </a:r>
-          </a:p>
-        </p:txBody>
-      </p:sp>
-    </p:spTree>
-    <p:extLst>
-      <p:ext uri="{BB962C8B-B14F-4D97-AF65-F5344CB8AC3E}">
-        <p14:creationId xmlns:p14="http://schemas.microsoft.com/office/powerpoint/2010/main" val="4185919456"/>
-      </p:ext>
-    </p:extLst>
-  </p:cSld>
-  <p:clrMapOvr>
-    <a:masterClrMapping/>
-  </p:clrMapOvr>
-</p:sld>
-</file>
-
-<file path=ppt/slides/slide13.xml><?xml version="1.0" encoding="utf-8"?>
-<p:sld xmlns:a="http://schemas.openxmlformats.org/drawingml/2006/main" xmlns:r="http://schemas.openxmlformats.org/officeDocument/2006/relationships" xmlns:p="http://schemas.openxmlformats.org/presentationml/2006/main">
-  <p:cSld>
-    <p:spTree>
-      <p:nvGrpSpPr>
         <p:cNvPr id="1" name=""/>
         <p:cNvGrpSpPr/>
         <p:nvPr/>
@@ -17441,16 +16860,8 @@
           <a:lstStyle/>
           <a:p>
             <a:r>
-              <a:rPr lang="en-US"/>
-              <a:t>30 min Exercise –</a:t>
-            </a:r>
-            <a:r>
-              <a:rPr lang="en-US" err="1"/>
-              <a:t>explian</a:t>
-            </a:r>
-            <a:r>
-              <a:rPr lang="en-US"/>
-              <a:t> how is the theme developed?</a:t>
+              <a:rPr lang="en-US" dirty="0"/>
+              <a:t>30 min Exercise –a child theme for ASTRA </a:t>
             </a:r>
           </a:p>
         </p:txBody>
@@ -17468,7 +16879,7 @@
 </p:sld>
 </file>
 
-<file path=ppt/slides/slide14.xml><?xml version="1.0" encoding="utf-8"?>
+<file path=ppt/slides/slide12.xml><?xml version="1.0" encoding="utf-8"?>
 <p:sld xmlns:a="http://schemas.openxmlformats.org/drawingml/2006/main" xmlns:r="http://schemas.openxmlformats.org/officeDocument/2006/relationships" xmlns:p="http://schemas.openxmlformats.org/presentationml/2006/main">
   <p:cSld>
     <p:spTree>
@@ -17691,7 +17102,7 @@
 </p:sld>
 </file>
 
-<file path=ppt/slides/slide15.xml><?xml version="1.0" encoding="utf-8"?>
+<file path=ppt/slides/slide13.xml><?xml version="1.0" encoding="utf-8"?>
 <p:sld xmlns:a="http://schemas.openxmlformats.org/drawingml/2006/main" xmlns:r="http://schemas.openxmlformats.org/officeDocument/2006/relationships" xmlns:p="http://schemas.openxmlformats.org/presentationml/2006/main">
   <p:cSld>
     <p:spTree>
@@ -17952,7 +17363,7 @@
 </p:sld>
 </file>
 
-<file path=ppt/slides/slide16.xml><?xml version="1.0" encoding="utf-8"?>
+<file path=ppt/slides/slide14.xml><?xml version="1.0" encoding="utf-8"?>
 <p:sld xmlns:a="http://schemas.openxmlformats.org/drawingml/2006/main" xmlns:r="http://schemas.openxmlformats.org/officeDocument/2006/relationships" xmlns:p="http://schemas.openxmlformats.org/presentationml/2006/main">
   <p:cSld>
     <p:spTree>
@@ -18764,7 +18175,7 @@
 </p:sld>
 </file>
 
-<file path=ppt/slides/slide17.xml><?xml version="1.0" encoding="utf-8"?>
+<file path=ppt/slides/slide15.xml><?xml version="1.0" encoding="utf-8"?>
 <p:sld xmlns:a="http://schemas.openxmlformats.org/drawingml/2006/main" xmlns:r="http://schemas.openxmlformats.org/officeDocument/2006/relationships" xmlns:p="http://schemas.openxmlformats.org/presentationml/2006/main">
   <p:cSld>
     <p:spTree>
@@ -18886,7 +18297,7 @@
 </p:sld>
 </file>
 
-<file path=ppt/slides/slide18.xml><?xml version="1.0" encoding="utf-8"?>
+<file path=ppt/slides/slide16.xml><?xml version="1.0" encoding="utf-8"?>
 <p:sld xmlns:a="http://schemas.openxmlformats.org/drawingml/2006/main" xmlns:r="http://schemas.openxmlformats.org/officeDocument/2006/relationships" xmlns:p="http://schemas.openxmlformats.org/presentationml/2006/main">
   <p:cSld>
     <p:spTree>
@@ -18984,7 +18395,100 @@
 </p:sld>
 </file>
 
-<file path=ppt/slides/slide19.xml><?xml version="1.0" encoding="utf-8"?>
+<file path=ppt/slides/slide17.xml><?xml version="1.0" encoding="utf-8"?>
+<p:sld xmlns:a="http://schemas.openxmlformats.org/drawingml/2006/main" xmlns:r="http://schemas.openxmlformats.org/officeDocument/2006/relationships" xmlns:p="http://schemas.openxmlformats.org/presentationml/2006/main">
+  <p:cSld>
+    <p:spTree>
+      <p:nvGrpSpPr>
+        <p:cNvPr id="1" name=""/>
+        <p:cNvGrpSpPr/>
+        <p:nvPr/>
+      </p:nvGrpSpPr>
+      <p:grpSpPr>
+        <a:xfrm>
+          <a:off x="0" y="0"/>
+          <a:ext cx="0" cy="0"/>
+          <a:chOff x="0" y="0"/>
+          <a:chExt cx="0" cy="0"/>
+        </a:xfrm>
+      </p:grpSpPr>
+      <p:sp>
+        <p:nvSpPr>
+          <p:cNvPr id="2" name="Title 1">
+            <a:extLst>
+              <a:ext uri="{FF2B5EF4-FFF2-40B4-BE49-F238E27FC236}">
+                <a16:creationId xmlns:a16="http://schemas.microsoft.com/office/drawing/2014/main" id="{D96A81FD-48E2-EB50-84A4-501F63DE8ABE}"/>
+              </a:ext>
+            </a:extLst>
+          </p:cNvPr>
+          <p:cNvSpPr>
+            <a:spLocks noGrp="1"/>
+          </p:cNvSpPr>
+          <p:nvPr>
+            <p:ph type="title"/>
+          </p:nvPr>
+        </p:nvSpPr>
+        <p:spPr/>
+        <p:txBody>
+          <a:bodyPr/>
+          <a:lstStyle/>
+          <a:p>
+            <a:r>
+              <a:rPr lang="en-GB" dirty="0"/>
+              <a:t>C</a:t>
+            </a:r>
+            <a:r>
+              <a:rPr lang="en-DK" dirty="0"/>
+              <a:t>ustom post type</a:t>
+            </a:r>
+          </a:p>
+        </p:txBody>
+      </p:sp>
+      <p:sp>
+        <p:nvSpPr>
+          <p:cNvPr id="3" name="Text Placeholder 2">
+            <a:extLst>
+              <a:ext uri="{FF2B5EF4-FFF2-40B4-BE49-F238E27FC236}">
+                <a16:creationId xmlns:a16="http://schemas.microsoft.com/office/drawing/2014/main" id="{8AD6A6C6-FF26-9DF7-8280-FBCE0C7D04A4}"/>
+              </a:ext>
+            </a:extLst>
+          </p:cNvPr>
+          <p:cNvSpPr>
+            <a:spLocks noGrp="1"/>
+          </p:cNvSpPr>
+          <p:nvPr>
+            <p:ph type="body" idx="1"/>
+          </p:nvPr>
+        </p:nvSpPr>
+        <p:spPr/>
+        <p:txBody>
+          <a:bodyPr/>
+          <a:lstStyle/>
+          <a:p>
+            <a:pPr marL="114300" indent="0">
+              <a:buNone/>
+            </a:pPr>
+            <a:r>
+              <a:rPr lang="en-DK" dirty="0"/>
+              <a:t>-a plugin to develop your own receipe post type</a:t>
+            </a:r>
+          </a:p>
+        </p:txBody>
+      </p:sp>
+    </p:spTree>
+    <p:extLst>
+      <p:ext uri="{BB962C8B-B14F-4D97-AF65-F5344CB8AC3E}">
+        <p14:creationId xmlns:p14="http://schemas.microsoft.com/office/powerpoint/2010/main" val="639971755"/>
+      </p:ext>
+    </p:extLst>
+  </p:cSld>
+  <p:clrMapOvr>
+    <a:masterClrMapping/>
+  </p:clrMapOvr>
+</p:sld>
+</file>
+
+<file path=ppt/slides/slide18.xml><?xml version="1.0" encoding="utf-8"?>
 <p:sld xmlns:a="http://schemas.openxmlformats.org/drawingml/2006/main" xmlns:r="http://schemas.openxmlformats.org/officeDocument/2006/relationships" xmlns:p="http://schemas.openxmlformats.org/presentationml/2006/main">
   <p:cSld>
     <p:spTree>
@@ -19110,65 +18614,7 @@
 </p:sld>
 </file>
 
-<file path=ppt/slides/slide2.xml><?xml version="1.0" encoding="utf-8"?>
-<p:sld xmlns:a="http://schemas.openxmlformats.org/drawingml/2006/main" xmlns:r="http://schemas.openxmlformats.org/officeDocument/2006/relationships" xmlns:p="http://schemas.openxmlformats.org/presentationml/2006/main">
-  <p:cSld>
-    <p:spTree>
-      <p:nvGrpSpPr>
-        <p:cNvPr id="1" name=""/>
-        <p:cNvGrpSpPr/>
-        <p:nvPr/>
-      </p:nvGrpSpPr>
-      <p:grpSpPr>
-        <a:xfrm>
-          <a:off x="0" y="0"/>
-          <a:ext cx="0" cy="0"/>
-          <a:chOff x="0" y="0"/>
-          <a:chExt cx="0" cy="0"/>
-        </a:xfrm>
-      </p:grpSpPr>
-      <p:sp>
-        <p:nvSpPr>
-          <p:cNvPr id="2" name="Title 1">
-            <a:extLst>
-              <a:ext uri="{FF2B5EF4-FFF2-40B4-BE49-F238E27FC236}">
-                <a16:creationId xmlns:a16="http://schemas.microsoft.com/office/drawing/2014/main" id="{C99EF469-4AB1-D838-597F-8CCD0BDBC354}"/>
-              </a:ext>
-            </a:extLst>
-          </p:cNvPr>
-          <p:cNvSpPr>
-            <a:spLocks noGrp="1"/>
-          </p:cNvSpPr>
-          <p:nvPr>
-            <p:ph type="title"/>
-          </p:nvPr>
-        </p:nvSpPr>
-        <p:spPr/>
-        <p:txBody>
-          <a:bodyPr/>
-          <a:lstStyle/>
-          <a:p>
-            <a:r>
-              <a:rPr lang="en-US"/>
-              <a:t>PHP</a:t>
-            </a:r>
-          </a:p>
-        </p:txBody>
-      </p:sp>
-    </p:spTree>
-    <p:extLst>
-      <p:ext uri="{BB962C8B-B14F-4D97-AF65-F5344CB8AC3E}">
-        <p14:creationId xmlns:p14="http://schemas.microsoft.com/office/powerpoint/2010/main" val="2065353579"/>
-      </p:ext>
-    </p:extLst>
-  </p:cSld>
-  <p:clrMapOvr>
-    <a:masterClrMapping/>
-  </p:clrMapOvr>
-</p:sld>
-</file>
-
-<file path=ppt/slides/slide20.xml><?xml version="1.0" encoding="utf-8"?>
+<file path=ppt/slides/slide19.xml><?xml version="1.0" encoding="utf-8"?>
 <p:sld xmlns:a="http://schemas.openxmlformats.org/drawingml/2006/main" xmlns:r="http://schemas.openxmlformats.org/officeDocument/2006/relationships" xmlns:p="http://schemas.openxmlformats.org/presentationml/2006/main">
   <p:cSld>
     <p:spTree>
@@ -19254,7 +18700,65 @@
 </p:sld>
 </file>
 
-<file path=ppt/slides/slide21.xml><?xml version="1.0" encoding="utf-8"?>
+<file path=ppt/slides/slide2.xml><?xml version="1.0" encoding="utf-8"?>
+<p:sld xmlns:a="http://schemas.openxmlformats.org/drawingml/2006/main" xmlns:r="http://schemas.openxmlformats.org/officeDocument/2006/relationships" xmlns:p="http://schemas.openxmlformats.org/presentationml/2006/main">
+  <p:cSld>
+    <p:spTree>
+      <p:nvGrpSpPr>
+        <p:cNvPr id="1" name=""/>
+        <p:cNvGrpSpPr/>
+        <p:nvPr/>
+      </p:nvGrpSpPr>
+      <p:grpSpPr>
+        <a:xfrm>
+          <a:off x="0" y="0"/>
+          <a:ext cx="0" cy="0"/>
+          <a:chOff x="0" y="0"/>
+          <a:chExt cx="0" cy="0"/>
+        </a:xfrm>
+      </p:grpSpPr>
+      <p:sp>
+        <p:nvSpPr>
+          <p:cNvPr id="2" name="Title 1">
+            <a:extLst>
+              <a:ext uri="{FF2B5EF4-FFF2-40B4-BE49-F238E27FC236}">
+                <a16:creationId xmlns:a16="http://schemas.microsoft.com/office/drawing/2014/main" id="{C99EF469-4AB1-D838-597F-8CCD0BDBC354}"/>
+              </a:ext>
+            </a:extLst>
+          </p:cNvPr>
+          <p:cNvSpPr>
+            <a:spLocks noGrp="1"/>
+          </p:cNvSpPr>
+          <p:nvPr>
+            <p:ph type="title"/>
+          </p:nvPr>
+        </p:nvSpPr>
+        <p:spPr/>
+        <p:txBody>
+          <a:bodyPr/>
+          <a:lstStyle/>
+          <a:p>
+            <a:r>
+              <a:rPr lang="en-US"/>
+              <a:t>PHP</a:t>
+            </a:r>
+          </a:p>
+        </p:txBody>
+      </p:sp>
+    </p:spTree>
+    <p:extLst>
+      <p:ext uri="{BB962C8B-B14F-4D97-AF65-F5344CB8AC3E}">
+        <p14:creationId xmlns:p14="http://schemas.microsoft.com/office/powerpoint/2010/main" val="2065353579"/>
+      </p:ext>
+    </p:extLst>
+  </p:cSld>
+  <p:clrMapOvr>
+    <a:masterClrMapping/>
+  </p:clrMapOvr>
+</p:sld>
+</file>
+
+<file path=ppt/slides/slide20.xml><?xml version="1.0" encoding="utf-8"?>
 <p:sld xmlns:a="http://schemas.openxmlformats.org/drawingml/2006/main" xmlns:r="http://schemas.openxmlformats.org/officeDocument/2006/relationships" xmlns:p="http://schemas.openxmlformats.org/presentationml/2006/main">
   <p:cSld>
     <p:spTree>
@@ -21213,26 +20717,6 @@
 </file>
 
 <file path=customXml/item1.xml><?xml version="1.0" encoding="utf-8"?>
-<?mso-contentType ?>
-<FormTemplates xmlns="http://schemas.microsoft.com/sharepoint/v3/contenttype/forms">
-  <Display>DocumentLibraryForm</Display>
-  <Edit>DocumentLibraryForm</Edit>
-  <New>DocumentLibraryForm</New>
-</FormTemplates>
-</file>
-
-<file path=customXml/item2.xml><?xml version="1.0" encoding="utf-8"?>
-<p:properties xmlns:p="http://schemas.microsoft.com/office/2006/metadata/properties" xmlns:xsi="http://www.w3.org/2001/XMLSchema-instance" xmlns:pc="http://schemas.microsoft.com/office/infopath/2007/PartnerControls">
-  <documentManagement>
-    <lcf76f155ced4ddcb4097134ff3c332f xmlns="4c941f20-14ce-4665-b291-94eb918ebf61">
-      <Terms xmlns="http://schemas.microsoft.com/office/infopath/2007/PartnerControls"/>
-    </lcf76f155ced4ddcb4097134ff3c332f>
-    <TaxCatchAll xmlns="462ed1df-cb75-4587-b36b-8b9f72fea3cc" xsi:nil="true"/>
-  </documentManagement>
-</p:properties>
-</file>
-
-<file path=customXml/item3.xml><?xml version="1.0" encoding="utf-8"?>
 <ct:contentTypeSchema xmlns:ct="http://schemas.microsoft.com/office/2006/metadata/contentType" xmlns:ma="http://schemas.microsoft.com/office/2006/metadata/properties/metaAttributes" ct:_="" ma:_="" ma:contentTypeName="Document" ma:contentTypeID="0x010100C7DB9406436736408CD9311F4BED34AF" ma:contentTypeVersion="15" ma:contentTypeDescription="Create a new document." ma:contentTypeScope="" ma:versionID="8ff7c457a4ec4e9c04cc5501e8d20923">
   <xsd:schema xmlns:xsd="http://www.w3.org/2001/XMLSchema" xmlns:xs="http://www.w3.org/2001/XMLSchema" xmlns:p="http://schemas.microsoft.com/office/2006/metadata/properties" xmlns:ns2="4c941f20-14ce-4665-b291-94eb918ebf61" xmlns:ns3="462ed1df-cb75-4587-b36b-8b9f72fea3cc" targetNamespace="http://schemas.microsoft.com/office/2006/metadata/properties" ma:root="true" ma:fieldsID="987ceea7d37db2b38412e321c3ceb378" ns2:_="" ns3:_="">
     <xsd:import namespace="4c941f20-14ce-4665-b291-94eb918ebf61"/>
@@ -21467,10 +20951,41 @@
 </ct:contentTypeSchema>
 </file>
 
+<file path=customXml/item2.xml><?xml version="1.0" encoding="utf-8"?>
+<p:properties xmlns:p="http://schemas.microsoft.com/office/2006/metadata/properties" xmlns:xsi="http://www.w3.org/2001/XMLSchema-instance" xmlns:pc="http://schemas.microsoft.com/office/infopath/2007/PartnerControls">
+  <documentManagement>
+    <lcf76f155ced4ddcb4097134ff3c332f xmlns="4c941f20-14ce-4665-b291-94eb918ebf61">
+      <Terms xmlns="http://schemas.microsoft.com/office/infopath/2007/PartnerControls"/>
+    </lcf76f155ced4ddcb4097134ff3c332f>
+    <TaxCatchAll xmlns="462ed1df-cb75-4587-b36b-8b9f72fea3cc" xsi:nil="true"/>
+  </documentManagement>
+</p:properties>
+</file>
+
+<file path=customXml/item3.xml><?xml version="1.0" encoding="utf-8"?>
+<?mso-contentType ?>
+<FormTemplates xmlns="http://schemas.microsoft.com/sharepoint/v3/contenttype/forms">
+  <Display>DocumentLibraryForm</Display>
+  <Edit>DocumentLibraryForm</Edit>
+  <New>DocumentLibraryForm</New>
+</FormTemplates>
+</file>
+
 <file path=customXml/itemProps1.xml><?xml version="1.0" encoding="utf-8"?>
-<ds:datastoreItem xmlns:ds="http://schemas.openxmlformats.org/officeDocument/2006/customXml" ds:itemID="{315E7D01-0D95-46D5-9804-E56FB95A49A9}">
+<ds:datastoreItem xmlns:ds="http://schemas.openxmlformats.org/officeDocument/2006/customXml" ds:itemID="{81638AB4-2B8D-47EA-A69C-8D1C4DDE95EE}">
   <ds:schemaRefs>
-    <ds:schemaRef ds:uri="http://schemas.microsoft.com/sharepoint/v3/contenttype/forms"/>
+    <ds:schemaRef ds:uri="http://schemas.microsoft.com/office/2006/metadata/contentType"/>
+    <ds:schemaRef ds:uri="http://schemas.microsoft.com/office/2006/metadata/properties/metaAttributes"/>
+    <ds:schemaRef ds:uri="http://www.w3.org/2001/XMLSchema"/>
+    <ds:schemaRef ds:uri="http://schemas.microsoft.com/office/2006/metadata/properties"/>
+    <ds:schemaRef ds:uri="4c941f20-14ce-4665-b291-94eb918ebf61"/>
+    <ds:schemaRef ds:uri="462ed1df-cb75-4587-b36b-8b9f72fea3cc"/>
+    <ds:schemaRef ds:uri="http://schemas.microsoft.com/office/2006/documentManagement/types"/>
+    <ds:schemaRef ds:uri="http://schemas.microsoft.com/office/infopath/2007/PartnerControls"/>
+    <ds:schemaRef ds:uri="http://schemas.openxmlformats.org/package/2006/metadata/core-properties"/>
+    <ds:schemaRef ds:uri="http://purl.org/dc/elements/1.1/"/>
+    <ds:schemaRef ds:uri="http://purl.org/dc/terms/"/>
+    <ds:schemaRef ds:uri="http://schemas.microsoft.com/internal/obd"/>
   </ds:schemaRefs>
 </ds:datastoreItem>
 </file>
@@ -21489,5 +21004,9 @@
 </file>
 
 <file path=customXml/itemProps3.xml><?xml version="1.0" encoding="utf-8"?>
-<ds:datastoreItem xmlns:ds="http://schemas.openxmlformats.org/officeDocument/2006/customXml" ds:itemID="{81638AB4-2B8D-47EA-A69C-8D1C4DDE95EE}"/>
+<ds:datastoreItem xmlns:ds="http://schemas.openxmlformats.org/officeDocument/2006/customXml" ds:itemID="{315E7D01-0D95-46D5-9804-E56FB95A49A9}">
+  <ds:schemaRefs>
+    <ds:schemaRef ds:uri="http://schemas.microsoft.com/sharepoint/v3/contenttype/forms"/>
+  </ds:schemaRefs>
+</ds:datastoreItem>
 </file>
</xml_diff>